<commit_message>
Reorganization and editing readme files
</commit_message>
<xml_diff>
--- a/TeamPresentation/ProjectPresentation.pptx
+++ b/TeamPresentation/ProjectPresentation.pptx
@@ -6,6 +6,13 @@
   </p:sldMasterIdLst>
   <p:sldIdLst>
     <p:sldId id="256" r:id="rId2"/>
+    <p:sldId id="257" r:id="rId3"/>
+    <p:sldId id="260" r:id="rId4"/>
+    <p:sldId id="258" r:id="rId5"/>
+    <p:sldId id="261" r:id="rId6"/>
+    <p:sldId id="262" r:id="rId7"/>
+    <p:sldId id="263" r:id="rId8"/>
+    <p:sldId id="259" r:id="rId9"/>
   </p:sldIdLst>
   <p:sldSz cx="12192000" cy="6858000"/>
   <p:notesSz cx="6858000" cy="9144000"/>
@@ -104,7 +111,264 @@
       </a:defRPr>
     </a:lvl9pPr>
   </p:defaultTextStyle>
+  <p:extLst>
+    <p:ext uri="{EFAFB233-063F-42B5-8137-9DF3F51BA10A}">
+      <p15:sldGuideLst xmlns:p15="http://schemas.microsoft.com/office/powerpoint/2012/main"/>
+    </p:ext>
+  </p:extLst>
 </p:presentation>
+</file>
+
+<file path=ppt/revisionInfo.xml><?xml version="1.0" encoding="utf-8"?>
+<p1510:revInfo xmlns:a="http://schemas.openxmlformats.org/drawingml/2006/main" xmlns:r="http://schemas.openxmlformats.org/officeDocument/2006/relationships" xmlns:p1510="http://schemas.microsoft.com/office/powerpoint/2015/10/main">
+  <p1510:revLst>
+    <p1510:client id="{387E982F-AC20-48A9-A5D7-3E1105CE4D48}" v="1190" dt="2024-03-10T21:50:02.926"/>
+    <p1510:client id="{5A9A608C-79B4-F36A-5251-F641E9E38D46}" v="31" dt="2024-03-10T21:41:58.677"/>
+  </p1510:revLst>
+</p1510:revInfo>
+</file>
+
+<file path=ppt/changesInfos/changesInfo1.xml><?xml version="1.0" encoding="utf-8"?>
+<pc:chgInfo xmlns:a="http://schemas.openxmlformats.org/drawingml/2006/main" xmlns:r="http://schemas.openxmlformats.org/officeDocument/2006/relationships" xmlns:ac="http://schemas.microsoft.com/office/drawing/2013/main/command" xmlns:pc="http://schemas.microsoft.com/office/powerpoint/2013/main/command">
+  <pc:docChgLst>
+    <pc:chgData name="Hunter Burnham (Student)" userId="e134f687-0b34-4f02-b471-2fa4d76ea700" providerId="ADAL" clId="{387E982F-AC20-48A9-A5D7-3E1105CE4D48}"/>
+    <pc:docChg chg="custSel addSld modSld sldOrd">
+      <pc:chgData name="Hunter Burnham (Student)" userId="e134f687-0b34-4f02-b471-2fa4d76ea700" providerId="ADAL" clId="{387E982F-AC20-48A9-A5D7-3E1105CE4D48}" dt="2024-03-10T21:50:02.926" v="1270" actId="313"/>
+      <pc:docMkLst>
+        <pc:docMk/>
+      </pc:docMkLst>
+      <pc:sldChg chg="modSp mod">
+        <pc:chgData name="Hunter Burnham (Student)" userId="e134f687-0b34-4f02-b471-2fa4d76ea700" providerId="ADAL" clId="{387E982F-AC20-48A9-A5D7-3E1105CE4D48}" dt="2024-03-10T21:39:06.123" v="94" actId="403"/>
+        <pc:sldMkLst>
+          <pc:docMk/>
+          <pc:sldMk cId="234320675" sldId="256"/>
+        </pc:sldMkLst>
+        <pc:spChg chg="mod">
+          <ac:chgData name="Hunter Burnham (Student)" userId="e134f687-0b34-4f02-b471-2fa4d76ea700" providerId="ADAL" clId="{387E982F-AC20-48A9-A5D7-3E1105CE4D48}" dt="2024-03-10T21:39:06.123" v="94" actId="403"/>
+          <ac:spMkLst>
+            <pc:docMk/>
+            <pc:sldMk cId="234320675" sldId="256"/>
+            <ac:spMk id="3" creationId="{4DFAF4A9-F54B-F3A4-7967-31664984E776}"/>
+          </ac:spMkLst>
+        </pc:spChg>
+      </pc:sldChg>
+      <pc:sldChg chg="modSp mod">
+        <pc:chgData name="Hunter Burnham (Student)" userId="e134f687-0b34-4f02-b471-2fa4d76ea700" providerId="ADAL" clId="{387E982F-AC20-48A9-A5D7-3E1105CE4D48}" dt="2024-03-10T21:45:46.567" v="833" actId="21"/>
+        <pc:sldMkLst>
+          <pc:docMk/>
+          <pc:sldMk cId="2116201992" sldId="257"/>
+        </pc:sldMkLst>
+        <pc:spChg chg="mod">
+          <ac:chgData name="Hunter Burnham (Student)" userId="e134f687-0b34-4f02-b471-2fa4d76ea700" providerId="ADAL" clId="{387E982F-AC20-48A9-A5D7-3E1105CE4D48}" dt="2024-03-10T21:42:00.791" v="322" actId="20577"/>
+          <ac:spMkLst>
+            <pc:docMk/>
+            <pc:sldMk cId="2116201992" sldId="257"/>
+            <ac:spMk id="2" creationId="{5DE2EB2F-13B1-E18C-7419-802122B6252C}"/>
+          </ac:spMkLst>
+        </pc:spChg>
+        <pc:spChg chg="mod">
+          <ac:chgData name="Hunter Burnham (Student)" userId="e134f687-0b34-4f02-b471-2fa4d76ea700" providerId="ADAL" clId="{387E982F-AC20-48A9-A5D7-3E1105CE4D48}" dt="2024-03-10T21:45:46.567" v="833" actId="21"/>
+          <ac:spMkLst>
+            <pc:docMk/>
+            <pc:sldMk cId="2116201992" sldId="257"/>
+            <ac:spMk id="3" creationId="{D46C8847-1CE6-DFDE-956F-4608305A5DC6}"/>
+          </ac:spMkLst>
+        </pc:spChg>
+      </pc:sldChg>
+      <pc:sldChg chg="modSp new mod">
+        <pc:chgData name="Hunter Burnham (Student)" userId="e134f687-0b34-4f02-b471-2fa4d76ea700" providerId="ADAL" clId="{387E982F-AC20-48A9-A5D7-3E1105CE4D48}" dt="2024-03-10T21:48:12.947" v="1208" actId="20577"/>
+        <pc:sldMkLst>
+          <pc:docMk/>
+          <pc:sldMk cId="572091724" sldId="258"/>
+        </pc:sldMkLst>
+        <pc:spChg chg="mod">
+          <ac:chgData name="Hunter Burnham (Student)" userId="e134f687-0b34-4f02-b471-2fa4d76ea700" providerId="ADAL" clId="{387E982F-AC20-48A9-A5D7-3E1105CE4D48}" dt="2024-03-10T21:39:39.850" v="126" actId="20577"/>
+          <ac:spMkLst>
+            <pc:docMk/>
+            <pc:sldMk cId="572091724" sldId="258"/>
+            <ac:spMk id="2" creationId="{F0E3B5F0-F703-3E5B-8F70-F125AC03285A}"/>
+          </ac:spMkLst>
+        </pc:spChg>
+        <pc:spChg chg="mod">
+          <ac:chgData name="Hunter Burnham (Student)" userId="e134f687-0b34-4f02-b471-2fa4d76ea700" providerId="ADAL" clId="{387E982F-AC20-48A9-A5D7-3E1105CE4D48}" dt="2024-03-10T21:48:12.947" v="1208" actId="20577"/>
+          <ac:spMkLst>
+            <pc:docMk/>
+            <pc:sldMk cId="572091724" sldId="258"/>
+            <ac:spMk id="3" creationId="{A196BE1C-312B-2E1D-77D0-B1BBB68FE8F2}"/>
+          </ac:spMkLst>
+        </pc:spChg>
+      </pc:sldChg>
+      <pc:sldChg chg="modSp mod ord">
+        <pc:chgData name="Hunter Burnham (Student)" userId="e134f687-0b34-4f02-b471-2fa4d76ea700" providerId="ADAL" clId="{387E982F-AC20-48A9-A5D7-3E1105CE4D48}" dt="2024-03-10T21:50:02.926" v="1270" actId="313"/>
+        <pc:sldMkLst>
+          <pc:docMk/>
+          <pc:sldMk cId="3372943132" sldId="259"/>
+        </pc:sldMkLst>
+        <pc:spChg chg="mod">
+          <ac:chgData name="Hunter Burnham (Student)" userId="e134f687-0b34-4f02-b471-2fa4d76ea700" providerId="ADAL" clId="{387E982F-AC20-48A9-A5D7-3E1105CE4D48}" dt="2024-03-10T21:40:40.749" v="182" actId="20577"/>
+          <ac:spMkLst>
+            <pc:docMk/>
+            <pc:sldMk cId="3372943132" sldId="259"/>
+            <ac:spMk id="2" creationId="{BEB5B745-96C1-51E4-7056-D9562589D0F5}"/>
+          </ac:spMkLst>
+        </pc:spChg>
+        <pc:spChg chg="mod">
+          <ac:chgData name="Hunter Burnham (Student)" userId="e134f687-0b34-4f02-b471-2fa4d76ea700" providerId="ADAL" clId="{387E982F-AC20-48A9-A5D7-3E1105CE4D48}" dt="2024-03-10T21:50:02.926" v="1270" actId="313"/>
+          <ac:spMkLst>
+            <pc:docMk/>
+            <pc:sldMk cId="3372943132" sldId="259"/>
+            <ac:spMk id="3" creationId="{00B45081-0BD4-AC98-E3FB-757FDF4BCC4C}"/>
+          </ac:spMkLst>
+        </pc:spChg>
+      </pc:sldChg>
+      <pc:sldChg chg="modSp new mod">
+        <pc:chgData name="Hunter Burnham (Student)" userId="e134f687-0b34-4f02-b471-2fa4d76ea700" providerId="ADAL" clId="{387E982F-AC20-48A9-A5D7-3E1105CE4D48}" dt="2024-03-10T21:45:55.502" v="836" actId="313"/>
+        <pc:sldMkLst>
+          <pc:docMk/>
+          <pc:sldMk cId="907987910" sldId="260"/>
+        </pc:sldMkLst>
+        <pc:spChg chg="mod">
+          <ac:chgData name="Hunter Burnham (Student)" userId="e134f687-0b34-4f02-b471-2fa4d76ea700" providerId="ADAL" clId="{387E982F-AC20-48A9-A5D7-3E1105CE4D48}" dt="2024-03-10T21:41:52.725" v="313" actId="20577"/>
+          <ac:spMkLst>
+            <pc:docMk/>
+            <pc:sldMk cId="907987910" sldId="260"/>
+            <ac:spMk id="2" creationId="{68F347CA-AC84-EF9D-06FA-C744906CD24A}"/>
+          </ac:spMkLst>
+        </pc:spChg>
+        <pc:spChg chg="mod">
+          <ac:chgData name="Hunter Burnham (Student)" userId="e134f687-0b34-4f02-b471-2fa4d76ea700" providerId="ADAL" clId="{387E982F-AC20-48A9-A5D7-3E1105CE4D48}" dt="2024-03-10T21:45:55.502" v="836" actId="313"/>
+          <ac:spMkLst>
+            <pc:docMk/>
+            <pc:sldMk cId="907987910" sldId="260"/>
+            <ac:spMk id="3" creationId="{F627CA05-FB38-7BCD-DA2E-437F6146B06B}"/>
+          </ac:spMkLst>
+        </pc:spChg>
+      </pc:sldChg>
+      <pc:sldChg chg="modSp mod">
+        <pc:chgData name="Hunter Burnham (Student)" userId="e134f687-0b34-4f02-b471-2fa4d76ea700" providerId="ADAL" clId="{387E982F-AC20-48A9-A5D7-3E1105CE4D48}" dt="2024-03-10T21:48:18.555" v="1210"/>
+        <pc:sldMkLst>
+          <pc:docMk/>
+          <pc:sldMk cId="3928215850" sldId="261"/>
+        </pc:sldMkLst>
+        <pc:spChg chg="mod">
+          <ac:chgData name="Hunter Burnham (Student)" userId="e134f687-0b34-4f02-b471-2fa4d76ea700" providerId="ADAL" clId="{387E982F-AC20-48A9-A5D7-3E1105CE4D48}" dt="2024-03-10T21:41:04.040" v="210" actId="20577"/>
+          <ac:spMkLst>
+            <pc:docMk/>
+            <pc:sldMk cId="3928215850" sldId="261"/>
+            <ac:spMk id="2" creationId="{FD5CBC22-CD60-DEC3-9B70-431914163214}"/>
+          </ac:spMkLst>
+        </pc:spChg>
+        <pc:spChg chg="mod">
+          <ac:chgData name="Hunter Burnham (Student)" userId="e134f687-0b34-4f02-b471-2fa4d76ea700" providerId="ADAL" clId="{387E982F-AC20-48A9-A5D7-3E1105CE4D48}" dt="2024-03-10T21:48:18.555" v="1210"/>
+          <ac:spMkLst>
+            <pc:docMk/>
+            <pc:sldMk cId="3928215850" sldId="261"/>
+            <ac:spMk id="3" creationId="{82E4FC8A-EAFF-352A-DBD5-537E16C616C2}"/>
+          </ac:spMkLst>
+        </pc:spChg>
+      </pc:sldChg>
+      <pc:sldChg chg="modSp new mod">
+        <pc:chgData name="Hunter Burnham (Student)" userId="e134f687-0b34-4f02-b471-2fa4d76ea700" providerId="ADAL" clId="{387E982F-AC20-48A9-A5D7-3E1105CE4D48}" dt="2024-03-10T21:48:20.925" v="1212"/>
+        <pc:sldMkLst>
+          <pc:docMk/>
+          <pc:sldMk cId="3446202391" sldId="262"/>
+        </pc:sldMkLst>
+        <pc:spChg chg="mod">
+          <ac:chgData name="Hunter Burnham (Student)" userId="e134f687-0b34-4f02-b471-2fa4d76ea700" providerId="ADAL" clId="{387E982F-AC20-48A9-A5D7-3E1105CE4D48}" dt="2024-03-10T21:41:45.407" v="304" actId="20577"/>
+          <ac:spMkLst>
+            <pc:docMk/>
+            <pc:sldMk cId="3446202391" sldId="262"/>
+            <ac:spMk id="2" creationId="{468B33FC-5B50-2F21-E2B4-5EDC5DFC251A}"/>
+          </ac:spMkLst>
+        </pc:spChg>
+        <pc:spChg chg="mod">
+          <ac:chgData name="Hunter Burnham (Student)" userId="e134f687-0b34-4f02-b471-2fa4d76ea700" providerId="ADAL" clId="{387E982F-AC20-48A9-A5D7-3E1105CE4D48}" dt="2024-03-10T21:48:20.925" v="1212"/>
+          <ac:spMkLst>
+            <pc:docMk/>
+            <pc:sldMk cId="3446202391" sldId="262"/>
+            <ac:spMk id="3" creationId="{BAB3B5AD-7F8D-36AD-1390-9CEDC96A4C13}"/>
+          </ac:spMkLst>
+        </pc:spChg>
+      </pc:sldChg>
+      <pc:sldChg chg="modSp new mod">
+        <pc:chgData name="Hunter Burnham (Student)" userId="e134f687-0b34-4f02-b471-2fa4d76ea700" providerId="ADAL" clId="{387E982F-AC20-48A9-A5D7-3E1105CE4D48}" dt="2024-03-10T21:48:24.690" v="1214"/>
+        <pc:sldMkLst>
+          <pc:docMk/>
+          <pc:sldMk cId="2396793982" sldId="263"/>
+        </pc:sldMkLst>
+        <pc:spChg chg="mod">
+          <ac:chgData name="Hunter Burnham (Student)" userId="e134f687-0b34-4f02-b471-2fa4d76ea700" providerId="ADAL" clId="{387E982F-AC20-48A9-A5D7-3E1105CE4D48}" dt="2024-03-10T21:41:31.558" v="292" actId="20577"/>
+          <ac:spMkLst>
+            <pc:docMk/>
+            <pc:sldMk cId="2396793982" sldId="263"/>
+            <ac:spMk id="2" creationId="{6809C795-4042-CC5A-647E-5016B8E19E84}"/>
+          </ac:spMkLst>
+        </pc:spChg>
+        <pc:spChg chg="mod">
+          <ac:chgData name="Hunter Burnham (Student)" userId="e134f687-0b34-4f02-b471-2fa4d76ea700" providerId="ADAL" clId="{387E982F-AC20-48A9-A5D7-3E1105CE4D48}" dt="2024-03-10T21:48:24.690" v="1214"/>
+          <ac:spMkLst>
+            <pc:docMk/>
+            <pc:sldMk cId="2396793982" sldId="263"/>
+            <ac:spMk id="3" creationId="{A9AC157F-B5D5-20E2-9DA4-EA29118F63FC}"/>
+          </ac:spMkLst>
+        </pc:spChg>
+      </pc:sldChg>
+    </pc:docChg>
+  </pc:docChgLst>
+  <pc:docChgLst>
+    <pc:chgData name="Jonah Bertolino (Student)" userId="S::jonahbertolino@mines.edu::9e5659ea-b595-4c3b-9a51-e4ce62b2395f" providerId="AD" clId="Web-{5A9A608C-79B4-F36A-5251-F641E9E38D46}"/>
+    <pc:docChg chg="addSld delSld modSld sldOrd">
+      <pc:chgData name="Jonah Bertolino (Student)" userId="S::jonahbertolino@mines.edu::9e5659ea-b595-4c3b-9a51-e4ce62b2395f" providerId="AD" clId="Web-{5A9A608C-79B4-F36A-5251-F641E9E38D46}" dt="2024-03-10T21:41:58.677" v="27"/>
+      <pc:docMkLst>
+        <pc:docMk/>
+      </pc:docMkLst>
+      <pc:sldChg chg="new">
+        <pc:chgData name="Jonah Bertolino (Student)" userId="S::jonahbertolino@mines.edu::9e5659ea-b595-4c3b-9a51-e4ce62b2395f" providerId="AD" clId="Web-{5A9A608C-79B4-F36A-5251-F641E9E38D46}" dt="2024-03-10T21:38:50.174" v="0"/>
+        <pc:sldMkLst>
+          <pc:docMk/>
+          <pc:sldMk cId="2116201992" sldId="257"/>
+        </pc:sldMkLst>
+      </pc:sldChg>
+      <pc:sldChg chg="modSp new ord">
+        <pc:chgData name="Jonah Bertolino (Student)" userId="S::jonahbertolino@mines.edu::9e5659ea-b595-4c3b-9a51-e4ce62b2395f" providerId="AD" clId="Web-{5A9A608C-79B4-F36A-5251-F641E9E38D46}" dt="2024-03-10T21:41:58.677" v="27"/>
+        <pc:sldMkLst>
+          <pc:docMk/>
+          <pc:sldMk cId="3372943132" sldId="259"/>
+        </pc:sldMkLst>
+        <pc:spChg chg="mod">
+          <ac:chgData name="Jonah Bertolino (Student)" userId="S::jonahbertolino@mines.edu::9e5659ea-b595-4c3b-9a51-e4ce62b2395f" providerId="AD" clId="Web-{5A9A608C-79B4-F36A-5251-F641E9E38D46}" dt="2024-03-10T21:40:11.175" v="21" actId="20577"/>
+          <ac:spMkLst>
+            <pc:docMk/>
+            <pc:sldMk cId="3372943132" sldId="259"/>
+            <ac:spMk id="2" creationId="{BEB5B745-96C1-51E4-7056-D9562589D0F5}"/>
+          </ac:spMkLst>
+        </pc:spChg>
+      </pc:sldChg>
+      <pc:sldChg chg="new">
+        <pc:chgData name="Jonah Bertolino (Student)" userId="S::jonahbertolino@mines.edu::9e5659ea-b595-4c3b-9a51-e4ce62b2395f" providerId="AD" clId="Web-{5A9A608C-79B4-F36A-5251-F641E9E38D46}" dt="2024-03-10T21:39:54.190" v="10"/>
+        <pc:sldMkLst>
+          <pc:docMk/>
+          <pc:sldMk cId="3928215850" sldId="261"/>
+        </pc:sldMkLst>
+      </pc:sldChg>
+      <pc:sldChg chg="modSp new del">
+        <pc:chgData name="Jonah Bertolino (Student)" userId="S::jonahbertolino@mines.edu::9e5659ea-b595-4c3b-9a51-e4ce62b2395f" providerId="AD" clId="Web-{5A9A608C-79B4-F36A-5251-F641E9E38D46}" dt="2024-03-10T21:40:29.410" v="26"/>
+        <pc:sldMkLst>
+          <pc:docMk/>
+          <pc:sldMk cId="2107621315" sldId="262"/>
+        </pc:sldMkLst>
+        <pc:spChg chg="mod">
+          <ac:chgData name="Jonah Bertolino (Student)" userId="S::jonahbertolino@mines.edu::9e5659ea-b595-4c3b-9a51-e4ce62b2395f" providerId="AD" clId="Web-{5A9A608C-79B4-F36A-5251-F641E9E38D46}" dt="2024-03-10T21:40:23.472" v="25" actId="20577"/>
+          <ac:spMkLst>
+            <pc:docMk/>
+            <pc:sldMk cId="2107621315" sldId="262"/>
+            <ac:spMk id="2" creationId="{36D767C6-431B-F41E-77DD-74CB0B6E8974}"/>
+          </ac:spMkLst>
+        </pc:spChg>
+      </pc:sldChg>
+    </pc:docChg>
+  </pc:docChgLst>
+</pc:chgInfo>
 </file>
 
 <file path=ppt/slideLayouts/slideLayout1.xml><?xml version="1.0" encoding="utf-8"?>
@@ -3367,10 +3631,36 @@
         </p:nvSpPr>
         <p:spPr/>
         <p:txBody>
-          <a:bodyPr/>
-          <a:lstStyle/>
-          <a:p>
-            <a:endParaRPr lang="en-US"/>
+          <a:bodyPr>
+            <a:normAutofit/>
+          </a:bodyPr>
+          <a:lstStyle/>
+          <a:p>
+            <a:r>
+              <a:rPr lang="en-US" sz="2000"/>
+              <a:t>Jonah </a:t>
+            </a:r>
+            <a:r>
+              <a:rPr lang="en-US" sz="2000" err="1"/>
+              <a:t>Bertolino</a:t>
+            </a:r>
+            <a:r>
+              <a:rPr lang="en-US" sz="2000"/>
+              <a:t>, Hunter Burnham, Joseph Kirby, Joel </a:t>
+            </a:r>
+            <a:r>
+              <a:rPr lang="en-US" sz="2000" err="1"/>
+              <a:t>Shorey</a:t>
+            </a:r>
+            <a:r>
+              <a:rPr lang="en-US" sz="2000"/>
+              <a:t>,  Caden </a:t>
+            </a:r>
+            <a:r>
+              <a:rPr lang="en-US" sz="2000" err="1"/>
+              <a:t>Nubel</a:t>
+            </a:r>
+            <a:endParaRPr lang="en-US" sz="2000"/>
           </a:p>
         </p:txBody>
       </p:sp>
@@ -3378,6 +3668,797 @@
     <p:extLst>
       <p:ext uri="{BB962C8B-B14F-4D97-AF65-F5344CB8AC3E}">
         <p14:creationId xmlns:p14="http://schemas.microsoft.com/office/powerpoint/2010/main" val="234320675"/>
+      </p:ext>
+    </p:extLst>
+  </p:cSld>
+  <p:clrMapOvr>
+    <a:masterClrMapping/>
+  </p:clrMapOvr>
+</p:sld>
+</file>
+
+<file path=ppt/slides/slide2.xml><?xml version="1.0" encoding="utf-8"?>
+<p:sld xmlns:a="http://schemas.openxmlformats.org/drawingml/2006/main" xmlns:r="http://schemas.openxmlformats.org/officeDocument/2006/relationships" xmlns:p="http://schemas.openxmlformats.org/presentationml/2006/main">
+  <p:cSld>
+    <p:spTree>
+      <p:nvGrpSpPr>
+        <p:cNvPr id="1" name=""/>
+        <p:cNvGrpSpPr/>
+        <p:nvPr/>
+      </p:nvGrpSpPr>
+      <p:grpSpPr>
+        <a:xfrm>
+          <a:off x="0" y="0"/>
+          <a:ext cx="0" cy="0"/>
+          <a:chOff x="0" y="0"/>
+          <a:chExt cx="0" cy="0"/>
+        </a:xfrm>
+      </p:grpSpPr>
+      <p:sp>
+        <p:nvSpPr>
+          <p:cNvPr id="2" name="Title 1">
+            <a:extLst>
+              <a:ext uri="{FF2B5EF4-FFF2-40B4-BE49-F238E27FC236}">
+                <a16:creationId xmlns:a16="http://schemas.microsoft.com/office/drawing/2014/main" id="{5DE2EB2F-13B1-E18C-7419-802122B6252C}"/>
+              </a:ext>
+            </a:extLst>
+          </p:cNvPr>
+          <p:cNvSpPr>
+            <a:spLocks noGrp="1"/>
+          </p:cNvSpPr>
+          <p:nvPr>
+            <p:ph type="title"/>
+          </p:nvPr>
+        </p:nvSpPr>
+        <p:spPr/>
+        <p:txBody>
+          <a:bodyPr/>
+          <a:lstStyle/>
+          <a:p>
+            <a:r>
+              <a:rPr lang="en-US"/>
+              <a:t>Project Overview</a:t>
+            </a:r>
+          </a:p>
+        </p:txBody>
+      </p:sp>
+      <p:sp>
+        <p:nvSpPr>
+          <p:cNvPr id="3" name="Content Placeholder 2">
+            <a:extLst>
+              <a:ext uri="{FF2B5EF4-FFF2-40B4-BE49-F238E27FC236}">
+                <a16:creationId xmlns:a16="http://schemas.microsoft.com/office/drawing/2014/main" id="{D46C8847-1CE6-DFDE-956F-4608305A5DC6}"/>
+              </a:ext>
+            </a:extLst>
+          </p:cNvPr>
+          <p:cNvSpPr>
+            <a:spLocks noGrp="1"/>
+          </p:cNvSpPr>
+          <p:nvPr>
+            <p:ph idx="1"/>
+          </p:nvPr>
+        </p:nvSpPr>
+        <p:spPr/>
+        <p:txBody>
+          <a:bodyPr/>
+          <a:lstStyle/>
+          <a:p>
+            <a:r>
+              <a:rPr lang="en-US"/>
+              <a:t>General Overview</a:t>
+            </a:r>
+          </a:p>
+          <a:p>
+            <a:r>
+              <a:rPr lang="en-US"/>
+              <a:t>Measures of success</a:t>
+            </a:r>
+          </a:p>
+          <a:p>
+            <a:r>
+              <a:rPr lang="en-US"/>
+              <a:t>Well defined technical information (i.e. define </a:t>
+            </a:r>
+            <a:r>
+              <a:rPr lang="en-US" err="1"/>
+              <a:t>aruco</a:t>
+            </a:r>
+            <a:r>
+              <a:rPr lang="en-US"/>
+              <a:t> markers, PID or whatever </a:t>
+            </a:r>
+            <a:r>
+              <a:rPr lang="en-US" err="1"/>
+              <a:t>controllors</a:t>
+            </a:r>
+            <a:r>
+              <a:rPr lang="en-US"/>
+              <a:t>, i2c)</a:t>
+            </a:r>
+          </a:p>
+          <a:p>
+            <a:r>
+              <a:rPr lang="en-US"/>
+              <a:t>Brief description of Resources used (</a:t>
+            </a:r>
+            <a:r>
+              <a:rPr lang="en-US" err="1"/>
+              <a:t>opencv</a:t>
+            </a:r>
+            <a:r>
+              <a:rPr lang="en-US"/>
+              <a:t> and such)</a:t>
+            </a:r>
+          </a:p>
+          <a:p>
+            <a:endParaRPr lang="en-US"/>
+          </a:p>
+        </p:txBody>
+      </p:sp>
+    </p:spTree>
+    <p:extLst>
+      <p:ext uri="{BB962C8B-B14F-4D97-AF65-F5344CB8AC3E}">
+        <p14:creationId xmlns:p14="http://schemas.microsoft.com/office/powerpoint/2010/main" val="2116201992"/>
+      </p:ext>
+    </p:extLst>
+  </p:cSld>
+  <p:clrMapOvr>
+    <a:masterClrMapping/>
+  </p:clrMapOvr>
+</p:sld>
+</file>
+
+<file path=ppt/slides/slide3.xml><?xml version="1.0" encoding="utf-8"?>
+<p:sld xmlns:a="http://schemas.openxmlformats.org/drawingml/2006/main" xmlns:r="http://schemas.openxmlformats.org/officeDocument/2006/relationships" xmlns:p="http://schemas.openxmlformats.org/presentationml/2006/main">
+  <p:cSld>
+    <p:spTree>
+      <p:nvGrpSpPr>
+        <p:cNvPr id="1" name=""/>
+        <p:cNvGrpSpPr/>
+        <p:nvPr/>
+      </p:nvGrpSpPr>
+      <p:grpSpPr>
+        <a:xfrm>
+          <a:off x="0" y="0"/>
+          <a:ext cx="0" cy="0"/>
+          <a:chOff x="0" y="0"/>
+          <a:chExt cx="0" cy="0"/>
+        </a:xfrm>
+      </p:grpSpPr>
+      <p:sp>
+        <p:nvSpPr>
+          <p:cNvPr id="2" name="Title 1">
+            <a:extLst>
+              <a:ext uri="{FF2B5EF4-FFF2-40B4-BE49-F238E27FC236}">
+                <a16:creationId xmlns:a16="http://schemas.microsoft.com/office/drawing/2014/main" id="{68F347CA-AC84-EF9D-06FA-C744906CD24A}"/>
+              </a:ext>
+            </a:extLst>
+          </p:cNvPr>
+          <p:cNvSpPr>
+            <a:spLocks noGrp="1"/>
+          </p:cNvSpPr>
+          <p:nvPr>
+            <p:ph type="title"/>
+          </p:nvPr>
+        </p:nvSpPr>
+        <p:spPr/>
+        <p:txBody>
+          <a:bodyPr/>
+          <a:lstStyle/>
+          <a:p>
+            <a:r>
+              <a:rPr lang="en-US"/>
+              <a:t>System Introduction</a:t>
+            </a:r>
+          </a:p>
+        </p:txBody>
+      </p:sp>
+      <p:sp>
+        <p:nvSpPr>
+          <p:cNvPr id="3" name="Content Placeholder 2">
+            <a:extLst>
+              <a:ext uri="{FF2B5EF4-FFF2-40B4-BE49-F238E27FC236}">
+                <a16:creationId xmlns:a16="http://schemas.microsoft.com/office/drawing/2014/main" id="{F627CA05-FB38-7BCD-DA2E-437F6146B06B}"/>
+              </a:ext>
+            </a:extLst>
+          </p:cNvPr>
+          <p:cNvSpPr>
+            <a:spLocks noGrp="1"/>
+          </p:cNvSpPr>
+          <p:nvPr>
+            <p:ph idx="1"/>
+          </p:nvPr>
+        </p:nvSpPr>
+        <p:spPr/>
+        <p:txBody>
+          <a:bodyPr/>
+          <a:lstStyle/>
+          <a:p>
+            <a:r>
+              <a:rPr lang="en-US"/>
+              <a:t>Introduction of the robot we are building to meet the objective</a:t>
+            </a:r>
+          </a:p>
+          <a:p>
+            <a:r>
+              <a:rPr lang="en-US"/>
+              <a:t>Explain available components and their purpose and the subsystems they are a part of</a:t>
+            </a:r>
+          </a:p>
+          <a:p>
+            <a:r>
+              <a:rPr lang="en-US"/>
+              <a:t>Define objectives of subsystems</a:t>
+            </a:r>
+          </a:p>
+          <a:p>
+            <a:endParaRPr lang="en-US"/>
+          </a:p>
+        </p:txBody>
+      </p:sp>
+    </p:spTree>
+    <p:extLst>
+      <p:ext uri="{BB962C8B-B14F-4D97-AF65-F5344CB8AC3E}">
+        <p14:creationId xmlns:p14="http://schemas.microsoft.com/office/powerpoint/2010/main" val="907987910"/>
+      </p:ext>
+    </p:extLst>
+  </p:cSld>
+  <p:clrMapOvr>
+    <a:masterClrMapping/>
+  </p:clrMapOvr>
+</p:sld>
+</file>
+
+<file path=ppt/slides/slide4.xml><?xml version="1.0" encoding="utf-8"?>
+<p:sld xmlns:a="http://schemas.openxmlformats.org/drawingml/2006/main" xmlns:r="http://schemas.openxmlformats.org/officeDocument/2006/relationships" xmlns:p="http://schemas.openxmlformats.org/presentationml/2006/main">
+  <p:cSld>
+    <p:spTree>
+      <p:nvGrpSpPr>
+        <p:cNvPr id="1" name=""/>
+        <p:cNvGrpSpPr/>
+        <p:nvPr/>
+      </p:nvGrpSpPr>
+      <p:grpSpPr>
+        <a:xfrm>
+          <a:off x="0" y="0"/>
+          <a:ext cx="0" cy="0"/>
+          <a:chOff x="0" y="0"/>
+          <a:chExt cx="0" cy="0"/>
+        </a:xfrm>
+      </p:grpSpPr>
+      <p:sp>
+        <p:nvSpPr>
+          <p:cNvPr id="2" name="Title 1">
+            <a:extLst>
+              <a:ext uri="{FF2B5EF4-FFF2-40B4-BE49-F238E27FC236}">
+                <a16:creationId xmlns:a16="http://schemas.microsoft.com/office/drawing/2014/main" id="{F0E3B5F0-F703-3E5B-8F70-F125AC03285A}"/>
+              </a:ext>
+            </a:extLst>
+          </p:cNvPr>
+          <p:cNvSpPr>
+            <a:spLocks noGrp="1"/>
+          </p:cNvSpPr>
+          <p:nvPr>
+            <p:ph type="title"/>
+          </p:nvPr>
+        </p:nvSpPr>
+        <p:spPr/>
+        <p:txBody>
+          <a:bodyPr/>
+          <a:lstStyle/>
+          <a:p>
+            <a:r>
+              <a:rPr lang="en-US"/>
+              <a:t>Motor Subsystem</a:t>
+            </a:r>
+          </a:p>
+        </p:txBody>
+      </p:sp>
+      <p:sp>
+        <p:nvSpPr>
+          <p:cNvPr id="3" name="Content Placeholder 2">
+            <a:extLst>
+              <a:ext uri="{FF2B5EF4-FFF2-40B4-BE49-F238E27FC236}">
+                <a16:creationId xmlns:a16="http://schemas.microsoft.com/office/drawing/2014/main" id="{A196BE1C-312B-2E1D-77D0-B1BBB68FE8F2}"/>
+              </a:ext>
+            </a:extLst>
+          </p:cNvPr>
+          <p:cNvSpPr>
+            <a:spLocks noGrp="1"/>
+          </p:cNvSpPr>
+          <p:nvPr>
+            <p:ph idx="1"/>
+          </p:nvPr>
+        </p:nvSpPr>
+        <p:spPr/>
+        <p:txBody>
+          <a:bodyPr/>
+          <a:lstStyle/>
+          <a:p>
+            <a:r>
+              <a:rPr lang="en-US"/>
+              <a:t>Clearly defined Design process</a:t>
+            </a:r>
+          </a:p>
+          <a:p>
+            <a:r>
+              <a:rPr lang="en-US"/>
+              <a:t>Images and data that show design/build process</a:t>
+            </a:r>
+          </a:p>
+          <a:p>
+            <a:r>
+              <a:rPr lang="en-US"/>
+              <a:t>Show achieved performance of each subsystem</a:t>
+            </a:r>
+          </a:p>
+          <a:p>
+            <a:r>
+              <a:rPr lang="en-US"/>
+              <a:t>Graphs and tables with readable text</a:t>
+            </a:r>
+          </a:p>
+          <a:p>
+            <a:r>
+              <a:rPr lang="en-US"/>
+              <a:t>Block diagrams described in detail</a:t>
+            </a:r>
+          </a:p>
+          <a:p>
+            <a:r>
+              <a:rPr lang="en-US"/>
+              <a:t>Performance achievable (goal of subsystem that contributes to overall system success?)</a:t>
+            </a:r>
+          </a:p>
+        </p:txBody>
+      </p:sp>
+    </p:spTree>
+    <p:extLst>
+      <p:ext uri="{BB962C8B-B14F-4D97-AF65-F5344CB8AC3E}">
+        <p14:creationId xmlns:p14="http://schemas.microsoft.com/office/powerpoint/2010/main" val="572091724"/>
+      </p:ext>
+    </p:extLst>
+  </p:cSld>
+  <p:clrMapOvr>
+    <a:masterClrMapping/>
+  </p:clrMapOvr>
+</p:sld>
+</file>
+
+<file path=ppt/slides/slide5.xml><?xml version="1.0" encoding="utf-8"?>
+<p:sld xmlns:a="http://schemas.openxmlformats.org/drawingml/2006/main" xmlns:r="http://schemas.openxmlformats.org/officeDocument/2006/relationships" xmlns:p="http://schemas.openxmlformats.org/presentationml/2006/main">
+  <p:cSld>
+    <p:spTree>
+      <p:nvGrpSpPr>
+        <p:cNvPr id="1" name=""/>
+        <p:cNvGrpSpPr/>
+        <p:nvPr/>
+      </p:nvGrpSpPr>
+      <p:grpSpPr>
+        <a:xfrm>
+          <a:off x="0" y="0"/>
+          <a:ext cx="0" cy="0"/>
+          <a:chOff x="0" y="0"/>
+          <a:chExt cx="0" cy="0"/>
+        </a:xfrm>
+      </p:grpSpPr>
+      <p:sp>
+        <p:nvSpPr>
+          <p:cNvPr id="2" name="Title 1">
+            <a:extLst>
+              <a:ext uri="{FF2B5EF4-FFF2-40B4-BE49-F238E27FC236}">
+                <a16:creationId xmlns:a16="http://schemas.microsoft.com/office/drawing/2014/main" id="{FD5CBC22-CD60-DEC3-9B70-431914163214}"/>
+              </a:ext>
+            </a:extLst>
+          </p:cNvPr>
+          <p:cNvSpPr>
+            <a:spLocks noGrp="1"/>
+          </p:cNvSpPr>
+          <p:nvPr>
+            <p:ph type="title"/>
+          </p:nvPr>
+        </p:nvSpPr>
+        <p:spPr/>
+        <p:txBody>
+          <a:bodyPr/>
+          <a:lstStyle/>
+          <a:p>
+            <a:r>
+              <a:rPr lang="en-US"/>
+              <a:t>Control Subsystem</a:t>
+            </a:r>
+          </a:p>
+        </p:txBody>
+      </p:sp>
+      <p:sp>
+        <p:nvSpPr>
+          <p:cNvPr id="3" name="Content Placeholder 2">
+            <a:extLst>
+              <a:ext uri="{FF2B5EF4-FFF2-40B4-BE49-F238E27FC236}">
+                <a16:creationId xmlns:a16="http://schemas.microsoft.com/office/drawing/2014/main" id="{82E4FC8A-EAFF-352A-DBD5-537E16C616C2}"/>
+              </a:ext>
+            </a:extLst>
+          </p:cNvPr>
+          <p:cNvSpPr>
+            <a:spLocks noGrp="1"/>
+          </p:cNvSpPr>
+          <p:nvPr>
+            <p:ph idx="1"/>
+          </p:nvPr>
+        </p:nvSpPr>
+        <p:spPr/>
+        <p:txBody>
+          <a:bodyPr/>
+          <a:lstStyle/>
+          <a:p>
+            <a:r>
+              <a:rPr lang="en-US"/>
+              <a:t>Clearly defined Design process</a:t>
+            </a:r>
+          </a:p>
+          <a:p>
+            <a:r>
+              <a:rPr lang="en-US"/>
+              <a:t>Images and data that show design/build process</a:t>
+            </a:r>
+          </a:p>
+          <a:p>
+            <a:r>
+              <a:rPr lang="en-US"/>
+              <a:t>Show achieved performance of each subsystem</a:t>
+            </a:r>
+          </a:p>
+          <a:p>
+            <a:r>
+              <a:rPr lang="en-US"/>
+              <a:t>Graphs and tables with readable text</a:t>
+            </a:r>
+          </a:p>
+          <a:p>
+            <a:r>
+              <a:rPr lang="en-US"/>
+              <a:t>Block diagrams described in detail</a:t>
+            </a:r>
+          </a:p>
+          <a:p>
+            <a:r>
+              <a:rPr lang="en-US"/>
+              <a:t>Performance achievable (goal of subsystem that contributes to overall system success?)</a:t>
+            </a:r>
+          </a:p>
+          <a:p>
+            <a:endParaRPr lang="en-US"/>
+          </a:p>
+        </p:txBody>
+      </p:sp>
+    </p:spTree>
+    <p:extLst>
+      <p:ext uri="{BB962C8B-B14F-4D97-AF65-F5344CB8AC3E}">
+        <p14:creationId xmlns:p14="http://schemas.microsoft.com/office/powerpoint/2010/main" val="3928215850"/>
+      </p:ext>
+    </p:extLst>
+  </p:cSld>
+  <p:clrMapOvr>
+    <a:masterClrMapping/>
+  </p:clrMapOvr>
+</p:sld>
+</file>
+
+<file path=ppt/slides/slide6.xml><?xml version="1.0" encoding="utf-8"?>
+<p:sld xmlns:a="http://schemas.openxmlformats.org/drawingml/2006/main" xmlns:r="http://schemas.openxmlformats.org/officeDocument/2006/relationships" xmlns:p="http://schemas.openxmlformats.org/presentationml/2006/main">
+  <p:cSld>
+    <p:spTree>
+      <p:nvGrpSpPr>
+        <p:cNvPr id="1" name=""/>
+        <p:cNvGrpSpPr/>
+        <p:nvPr/>
+      </p:nvGrpSpPr>
+      <p:grpSpPr>
+        <a:xfrm>
+          <a:off x="0" y="0"/>
+          <a:ext cx="0" cy="0"/>
+          <a:chOff x="0" y="0"/>
+          <a:chExt cx="0" cy="0"/>
+        </a:xfrm>
+      </p:grpSpPr>
+      <p:sp>
+        <p:nvSpPr>
+          <p:cNvPr id="2" name="Title 1">
+            <a:extLst>
+              <a:ext uri="{FF2B5EF4-FFF2-40B4-BE49-F238E27FC236}">
+                <a16:creationId xmlns:a16="http://schemas.microsoft.com/office/drawing/2014/main" id="{468B33FC-5B50-2F21-E2B4-5EDC5DFC251A}"/>
+              </a:ext>
+            </a:extLst>
+          </p:cNvPr>
+          <p:cNvSpPr>
+            <a:spLocks noGrp="1"/>
+          </p:cNvSpPr>
+          <p:nvPr>
+            <p:ph type="title"/>
+          </p:nvPr>
+        </p:nvSpPr>
+        <p:spPr/>
+        <p:txBody>
+          <a:bodyPr/>
+          <a:lstStyle/>
+          <a:p>
+            <a:r>
+              <a:rPr lang="en-US"/>
+              <a:t>Computer Vision Subsystem</a:t>
+            </a:r>
+          </a:p>
+        </p:txBody>
+      </p:sp>
+      <p:sp>
+        <p:nvSpPr>
+          <p:cNvPr id="3" name="Content Placeholder 2">
+            <a:extLst>
+              <a:ext uri="{FF2B5EF4-FFF2-40B4-BE49-F238E27FC236}">
+                <a16:creationId xmlns:a16="http://schemas.microsoft.com/office/drawing/2014/main" id="{BAB3B5AD-7F8D-36AD-1390-9CEDC96A4C13}"/>
+              </a:ext>
+            </a:extLst>
+          </p:cNvPr>
+          <p:cNvSpPr>
+            <a:spLocks noGrp="1"/>
+          </p:cNvSpPr>
+          <p:nvPr>
+            <p:ph idx="1"/>
+          </p:nvPr>
+        </p:nvSpPr>
+        <p:spPr/>
+        <p:txBody>
+          <a:bodyPr/>
+          <a:lstStyle/>
+          <a:p>
+            <a:r>
+              <a:rPr lang="en-US"/>
+              <a:t>Clearly defined Design process</a:t>
+            </a:r>
+          </a:p>
+          <a:p>
+            <a:r>
+              <a:rPr lang="en-US"/>
+              <a:t>Images and data that show design/build process</a:t>
+            </a:r>
+          </a:p>
+          <a:p>
+            <a:r>
+              <a:rPr lang="en-US"/>
+              <a:t>Show achieved performance of each subsystem</a:t>
+            </a:r>
+          </a:p>
+          <a:p>
+            <a:r>
+              <a:rPr lang="en-US"/>
+              <a:t>Graphs and tables with readable text</a:t>
+            </a:r>
+          </a:p>
+          <a:p>
+            <a:r>
+              <a:rPr lang="en-US"/>
+              <a:t>Block diagrams described in detail</a:t>
+            </a:r>
+          </a:p>
+          <a:p>
+            <a:r>
+              <a:rPr lang="en-US"/>
+              <a:t>Performance achievable (goal of subsystem that contributes to overall system success?)</a:t>
+            </a:r>
+          </a:p>
+          <a:p>
+            <a:endParaRPr lang="en-US"/>
+          </a:p>
+        </p:txBody>
+      </p:sp>
+    </p:spTree>
+    <p:extLst>
+      <p:ext uri="{BB962C8B-B14F-4D97-AF65-F5344CB8AC3E}">
+        <p14:creationId xmlns:p14="http://schemas.microsoft.com/office/powerpoint/2010/main" val="3446202391"/>
+      </p:ext>
+    </p:extLst>
+  </p:cSld>
+  <p:clrMapOvr>
+    <a:masterClrMapping/>
+  </p:clrMapOvr>
+</p:sld>
+</file>
+
+<file path=ppt/slides/slide7.xml><?xml version="1.0" encoding="utf-8"?>
+<p:sld xmlns:a="http://schemas.openxmlformats.org/drawingml/2006/main" xmlns:r="http://schemas.openxmlformats.org/officeDocument/2006/relationships" xmlns:p="http://schemas.openxmlformats.org/presentationml/2006/main">
+  <p:cSld>
+    <p:spTree>
+      <p:nvGrpSpPr>
+        <p:cNvPr id="1" name=""/>
+        <p:cNvGrpSpPr/>
+        <p:nvPr/>
+      </p:nvGrpSpPr>
+      <p:grpSpPr>
+        <a:xfrm>
+          <a:off x="0" y="0"/>
+          <a:ext cx="0" cy="0"/>
+          <a:chOff x="0" y="0"/>
+          <a:chExt cx="0" cy="0"/>
+        </a:xfrm>
+      </p:grpSpPr>
+      <p:sp>
+        <p:nvSpPr>
+          <p:cNvPr id="2" name="Title 1">
+            <a:extLst>
+              <a:ext uri="{FF2B5EF4-FFF2-40B4-BE49-F238E27FC236}">
+                <a16:creationId xmlns:a16="http://schemas.microsoft.com/office/drawing/2014/main" id="{6809C795-4042-CC5A-647E-5016B8E19E84}"/>
+              </a:ext>
+            </a:extLst>
+          </p:cNvPr>
+          <p:cNvSpPr>
+            <a:spLocks noGrp="1"/>
+          </p:cNvSpPr>
+          <p:nvPr>
+            <p:ph type="title"/>
+          </p:nvPr>
+        </p:nvSpPr>
+        <p:spPr/>
+        <p:txBody>
+          <a:bodyPr/>
+          <a:lstStyle/>
+          <a:p>
+            <a:r>
+              <a:rPr lang="en-US"/>
+              <a:t>Communication and Integration</a:t>
+            </a:r>
+          </a:p>
+        </p:txBody>
+      </p:sp>
+      <p:sp>
+        <p:nvSpPr>
+          <p:cNvPr id="3" name="Content Placeholder 2">
+            <a:extLst>
+              <a:ext uri="{FF2B5EF4-FFF2-40B4-BE49-F238E27FC236}">
+                <a16:creationId xmlns:a16="http://schemas.microsoft.com/office/drawing/2014/main" id="{A9AC157F-B5D5-20E2-9DA4-EA29118F63FC}"/>
+              </a:ext>
+            </a:extLst>
+          </p:cNvPr>
+          <p:cNvSpPr>
+            <a:spLocks noGrp="1"/>
+          </p:cNvSpPr>
+          <p:nvPr>
+            <p:ph idx="1"/>
+          </p:nvPr>
+        </p:nvSpPr>
+        <p:spPr/>
+        <p:txBody>
+          <a:bodyPr/>
+          <a:lstStyle/>
+          <a:p>
+            <a:r>
+              <a:rPr lang="en-US"/>
+              <a:t>Clearly defined Design process</a:t>
+            </a:r>
+          </a:p>
+          <a:p>
+            <a:r>
+              <a:rPr lang="en-US"/>
+              <a:t>Images and data that show design/build process</a:t>
+            </a:r>
+          </a:p>
+          <a:p>
+            <a:r>
+              <a:rPr lang="en-US"/>
+              <a:t>Show achieved performance of each subsystem</a:t>
+            </a:r>
+          </a:p>
+          <a:p>
+            <a:r>
+              <a:rPr lang="en-US"/>
+              <a:t>Graphs and tables with readable text</a:t>
+            </a:r>
+          </a:p>
+          <a:p>
+            <a:r>
+              <a:rPr lang="en-US"/>
+              <a:t>Block diagrams described in detail</a:t>
+            </a:r>
+          </a:p>
+          <a:p>
+            <a:r>
+              <a:rPr lang="en-US"/>
+              <a:t>Performance achievable (goal of subsystem that contributes to overall system success?)</a:t>
+            </a:r>
+          </a:p>
+          <a:p>
+            <a:endParaRPr lang="en-US"/>
+          </a:p>
+        </p:txBody>
+      </p:sp>
+    </p:spTree>
+    <p:extLst>
+      <p:ext uri="{BB962C8B-B14F-4D97-AF65-F5344CB8AC3E}">
+        <p14:creationId xmlns:p14="http://schemas.microsoft.com/office/powerpoint/2010/main" val="2396793982"/>
+      </p:ext>
+    </p:extLst>
+  </p:cSld>
+  <p:clrMapOvr>
+    <a:masterClrMapping/>
+  </p:clrMapOvr>
+</p:sld>
+</file>
+
+<file path=ppt/slides/slide8.xml><?xml version="1.0" encoding="utf-8"?>
+<p:sld xmlns:a="http://schemas.openxmlformats.org/drawingml/2006/main" xmlns:r="http://schemas.openxmlformats.org/officeDocument/2006/relationships" xmlns:p="http://schemas.openxmlformats.org/presentationml/2006/main">
+  <p:cSld>
+    <p:spTree>
+      <p:nvGrpSpPr>
+        <p:cNvPr id="1" name=""/>
+        <p:cNvGrpSpPr/>
+        <p:nvPr/>
+      </p:nvGrpSpPr>
+      <p:grpSpPr>
+        <a:xfrm>
+          <a:off x="0" y="0"/>
+          <a:ext cx="0" cy="0"/>
+          <a:chOff x="0" y="0"/>
+          <a:chExt cx="0" cy="0"/>
+        </a:xfrm>
+      </p:grpSpPr>
+      <p:sp>
+        <p:nvSpPr>
+          <p:cNvPr id="2" name="Title 1">
+            <a:extLst>
+              <a:ext uri="{FF2B5EF4-FFF2-40B4-BE49-F238E27FC236}">
+                <a16:creationId xmlns:a16="http://schemas.microsoft.com/office/drawing/2014/main" id="{BEB5B745-96C1-51E4-7056-D9562589D0F5}"/>
+              </a:ext>
+            </a:extLst>
+          </p:cNvPr>
+          <p:cNvSpPr>
+            <a:spLocks noGrp="1"/>
+          </p:cNvSpPr>
+          <p:nvPr>
+            <p:ph type="title"/>
+          </p:nvPr>
+        </p:nvSpPr>
+        <p:spPr/>
+        <p:txBody>
+          <a:bodyPr/>
+          <a:lstStyle/>
+          <a:p>
+            <a:r>
+              <a:rPr lang="en-US"/>
+              <a:t>Simulations and Experiments (each group add something)</a:t>
+            </a:r>
+          </a:p>
+        </p:txBody>
+      </p:sp>
+      <p:sp>
+        <p:nvSpPr>
+          <p:cNvPr id="3" name="Content Placeholder 2">
+            <a:extLst>
+              <a:ext uri="{FF2B5EF4-FFF2-40B4-BE49-F238E27FC236}">
+                <a16:creationId xmlns:a16="http://schemas.microsoft.com/office/drawing/2014/main" id="{00B45081-0BD4-AC98-E3FB-757FDF4BCC4C}"/>
+              </a:ext>
+            </a:extLst>
+          </p:cNvPr>
+          <p:cNvSpPr>
+            <a:spLocks noGrp="1"/>
+          </p:cNvSpPr>
+          <p:nvPr>
+            <p:ph idx="1"/>
+          </p:nvPr>
+        </p:nvSpPr>
+        <p:spPr/>
+        <p:txBody>
+          <a:bodyPr/>
+          <a:lstStyle/>
+          <a:p>
+            <a:r>
+              <a:rPr lang="en-US"/>
+              <a:t>Could be part of each subsystem, probably won’t be its own piece of the presentation</a:t>
+            </a:r>
+          </a:p>
+        </p:txBody>
+      </p:sp>
+    </p:spTree>
+    <p:extLst>
+      <p:ext uri="{BB962C8B-B14F-4D97-AF65-F5344CB8AC3E}">
+        <p14:creationId xmlns:p14="http://schemas.microsoft.com/office/powerpoint/2010/main" val="3372943132"/>
       </p:ext>
     </p:extLst>
   </p:cSld>

</xml_diff>